<commit_message>
pushing android code and memory fade code
</commit_message>
<xml_diff>
--- a/Writings/Predictions.pptx
+++ b/Writings/Predictions.pptx
@@ -20,12 +20,13 @@
     <p:sldId id="273" r:id="rId14"/>
     <p:sldId id="274" r:id="rId15"/>
     <p:sldId id="276" r:id="rId16"/>
-    <p:sldId id="275" r:id="rId17"/>
-    <p:sldId id="271" r:id="rId18"/>
-    <p:sldId id="272" r:id="rId19"/>
-    <p:sldId id="267" r:id="rId20"/>
-    <p:sldId id="268" r:id="rId21"/>
-    <p:sldId id="269" r:id="rId22"/>
+    <p:sldId id="277" r:id="rId17"/>
+    <p:sldId id="275" r:id="rId18"/>
+    <p:sldId id="271" r:id="rId19"/>
+    <p:sldId id="272" r:id="rId20"/>
+    <p:sldId id="267" r:id="rId21"/>
+    <p:sldId id="268" r:id="rId22"/>
+    <p:sldId id="269" r:id="rId23"/>
   </p:sldIdLst>
   <p:sldSz cx="12192000" cy="6858000"/>
   <p:notesSz cx="6858000" cy="9144000"/>
@@ -7549,6 +7550,116 @@
           <p:cNvPr id="2" name="Title 1">
             <a:extLst>
               <a:ext uri="{FF2B5EF4-FFF2-40B4-BE49-F238E27FC236}">
+                <a16:creationId xmlns:a16="http://schemas.microsoft.com/office/drawing/2014/main" id="{A511EB2B-BF4C-43E8-9731-F90BCA3CA689}"/>
+              </a:ext>
+            </a:extLst>
+          </p:cNvPr>
+          <p:cNvSpPr>
+            <a:spLocks noGrp="1"/>
+          </p:cNvSpPr>
+          <p:nvPr>
+            <p:ph type="title"/>
+          </p:nvPr>
+        </p:nvSpPr>
+        <p:spPr/>
+        <p:txBody>
+          <a:bodyPr/>
+          <a:lstStyle/>
+          <a:p>
+            <a:endParaRPr lang="en-US"/>
+          </a:p>
+        </p:txBody>
+      </p:sp>
+      <p:sp>
+        <p:nvSpPr>
+          <p:cNvPr id="3" name="Content Placeholder 2">
+            <a:extLst>
+              <a:ext uri="{FF2B5EF4-FFF2-40B4-BE49-F238E27FC236}">
+                <a16:creationId xmlns:a16="http://schemas.microsoft.com/office/drawing/2014/main" id="{F4FB3747-9A32-461C-8562-A5170D21999C}"/>
+              </a:ext>
+            </a:extLst>
+          </p:cNvPr>
+          <p:cNvSpPr>
+            <a:spLocks noGrp="1"/>
+          </p:cNvSpPr>
+          <p:nvPr>
+            <p:ph idx="1"/>
+          </p:nvPr>
+        </p:nvSpPr>
+        <p:spPr/>
+        <p:txBody>
+          <a:bodyPr/>
+          <a:lstStyle/>
+          <a:p>
+            <a:endParaRPr lang="en-US"/>
+          </a:p>
+        </p:txBody>
+      </p:sp>
+      <p:pic>
+        <p:nvPicPr>
+          <p:cNvPr id="4" name="Picture 3">
+            <a:extLst>
+              <a:ext uri="{FF2B5EF4-FFF2-40B4-BE49-F238E27FC236}">
+                <a16:creationId xmlns:a16="http://schemas.microsoft.com/office/drawing/2014/main" id="{C1D29F15-8260-46A0-A272-9897CC06B2E8}"/>
+              </a:ext>
+            </a:extLst>
+          </p:cNvPr>
+          <p:cNvPicPr>
+            <a:picLocks noChangeAspect="1"/>
+          </p:cNvPicPr>
+          <p:nvPr/>
+        </p:nvPicPr>
+        <p:blipFill>
+          <a:blip r:embed="rId2"/>
+          <a:stretch>
+            <a:fillRect/>
+          </a:stretch>
+        </p:blipFill>
+        <p:spPr>
+          <a:xfrm>
+            <a:off x="3082212" y="0"/>
+            <a:ext cx="6027576" cy="6858000"/>
+          </a:xfrm>
+          <a:prstGeom prst="rect">
+            <a:avLst/>
+          </a:prstGeom>
+        </p:spPr>
+      </p:pic>
+    </p:spTree>
+    <p:extLst>
+      <p:ext uri="{BB962C8B-B14F-4D97-AF65-F5344CB8AC3E}">
+        <p14:creationId xmlns:p14="http://schemas.microsoft.com/office/powerpoint/2010/main" val="4232610760"/>
+      </p:ext>
+    </p:extLst>
+  </p:cSld>
+  <p:clrMapOvr>
+    <a:masterClrMapping/>
+  </p:clrMapOvr>
+</p:sld>
+</file>
+
+<file path=ppt/slides/slide17.xml><?xml version="1.0" encoding="utf-8"?>
+<p:sld xmlns:a="http://schemas.openxmlformats.org/drawingml/2006/main" xmlns:r="http://schemas.openxmlformats.org/officeDocument/2006/relationships" xmlns:p="http://schemas.openxmlformats.org/presentationml/2006/main">
+  <p:cSld>
+    <p:spTree>
+      <p:nvGrpSpPr>
+        <p:cNvPr id="1" name=""/>
+        <p:cNvGrpSpPr/>
+        <p:nvPr/>
+      </p:nvGrpSpPr>
+      <p:grpSpPr>
+        <a:xfrm>
+          <a:off x="0" y="0"/>
+          <a:ext cx="0" cy="0"/>
+          <a:chOff x="0" y="0"/>
+          <a:chExt cx="0" cy="0"/>
+        </a:xfrm>
+      </p:grpSpPr>
+      <p:sp>
+        <p:nvSpPr>
+          <p:cNvPr id="2" name="Title 1">
+            <a:extLst>
+              <a:ext uri="{FF2B5EF4-FFF2-40B4-BE49-F238E27FC236}">
                 <a16:creationId xmlns:a16="http://schemas.microsoft.com/office/drawing/2014/main" id="{88DE741C-324A-4456-A94C-1E754A348F3B}"/>
               </a:ext>
             </a:extLst>
@@ -7646,7 +7757,7 @@
 </p:sld>
 </file>
 
-<file path=ppt/slides/slide17.xml><?xml version="1.0" encoding="utf-8"?>
+<file path=ppt/slides/slide18.xml><?xml version="1.0" encoding="utf-8"?>
 <p:sld xmlns:a="http://schemas.openxmlformats.org/drawingml/2006/main" xmlns:r="http://schemas.openxmlformats.org/officeDocument/2006/relationships" xmlns:p="http://schemas.openxmlformats.org/presentationml/2006/main">
   <p:cSld>
     <p:bg>
@@ -8246,7 +8357,7 @@
 </p:sld>
 </file>
 
-<file path=ppt/slides/slide18.xml><?xml version="1.0" encoding="utf-8"?>
+<file path=ppt/slides/slide19.xml><?xml version="1.0" encoding="utf-8"?>
 <p:sld xmlns:a="http://schemas.openxmlformats.org/drawingml/2006/main" xmlns:r="http://schemas.openxmlformats.org/officeDocument/2006/relationships" xmlns:p="http://schemas.openxmlformats.org/presentationml/2006/main">
   <p:cSld>
     <p:spTree>
@@ -8612,315 +8723,6 @@
 </p:sld>
 </file>
 
-<file path=ppt/slides/slide19.xml><?xml version="1.0" encoding="utf-8"?>
-<p:sld xmlns:a="http://schemas.openxmlformats.org/drawingml/2006/main" xmlns:r="http://schemas.openxmlformats.org/officeDocument/2006/relationships" xmlns:p="http://schemas.openxmlformats.org/presentationml/2006/main">
-  <p:cSld>
-    <p:bg>
-      <p:bgPr>
-        <a:solidFill>
-          <a:schemeClr val="bg1"/>
-        </a:solidFill>
-        <a:effectLst/>
-      </p:bgPr>
-    </p:bg>
-    <p:spTree>
-      <p:nvGrpSpPr>
-        <p:cNvPr id="1" name=""/>
-        <p:cNvGrpSpPr/>
-        <p:nvPr/>
-      </p:nvGrpSpPr>
-      <p:grpSpPr>
-        <a:xfrm>
-          <a:off x="0" y="0"/>
-          <a:ext cx="0" cy="0"/>
-          <a:chOff x="0" y="0"/>
-          <a:chExt cx="0" cy="0"/>
-        </a:xfrm>
-      </p:grpSpPr>
-      <p:sp>
-        <p:nvSpPr>
-          <p:cNvPr id="10" name="Rectangle 9">
-            <a:extLst>
-              <a:ext uri="{FF2B5EF4-FFF2-40B4-BE49-F238E27FC236}">
-                <a16:creationId xmlns:a16="http://schemas.microsoft.com/office/drawing/2014/main" id="{6753252F-4873-4F63-801D-CC719279A7D5}"/>
-              </a:ext>
-              <a:ext uri="{C183D7F6-B498-43B3-948B-1728B52AA6E4}">
-                <adec:decorative xmlns:adec="http://schemas.microsoft.com/office/drawing/2017/decorative" val="1"/>
-              </a:ext>
-            </a:extLst>
-          </p:cNvPr>
-          <p:cNvSpPr>
-            <a:spLocks noGrp="1" noRot="1" noChangeAspect="1" noMove="1" noResize="1" noEditPoints="1" noAdjustHandles="1" noChangeArrowheads="1" noChangeShapeType="1" noTextEdit="1"/>
-          </p:cNvSpPr>
-          <p:nvPr>
-            <p:extLst>
-              <p:ext uri="{386F3935-93C4-4BCD-93E2-E3B085C9AB24}">
-                <p16:designElem xmlns:p16="http://schemas.microsoft.com/office/powerpoint/2015/main" val="1"/>
-              </p:ext>
-            </p:extLst>
-          </p:nvPr>
-        </p:nvSpPr>
-        <p:spPr>
-          <a:xfrm>
-            <a:off x="0" y="0"/>
-            <a:ext cx="12192000" cy="6858000"/>
-          </a:xfrm>
-          <a:prstGeom prst="rect">
-            <a:avLst/>
-          </a:prstGeom>
-          <a:solidFill>
-            <a:srgbClr val="FFFFFF"/>
-          </a:solidFill>
-          <a:ln>
-            <a:noFill/>
-          </a:ln>
-        </p:spPr>
-        <p:style>
-          <a:lnRef idx="2">
-            <a:schemeClr val="accent1">
-              <a:shade val="50000"/>
-            </a:schemeClr>
-          </a:lnRef>
-          <a:fillRef idx="1">
-            <a:schemeClr val="accent1"/>
-          </a:fillRef>
-          <a:effectRef idx="0">
-            <a:schemeClr val="accent1"/>
-          </a:effectRef>
-          <a:fontRef idx="minor">
-            <a:schemeClr val="lt1"/>
-          </a:fontRef>
-        </p:style>
-        <p:txBody>
-          <a:bodyPr rtlCol="0" anchor="ctr"/>
-          <a:lstStyle/>
-          <a:p>
-            <a:pPr algn="ctr"/>
-            <a:endParaRPr lang="en-US"/>
-          </a:p>
-        </p:txBody>
-      </p:sp>
-      <p:sp>
-        <p:nvSpPr>
-          <p:cNvPr id="12" name="Rectangle 11">
-            <a:extLst>
-              <a:ext uri="{FF2B5EF4-FFF2-40B4-BE49-F238E27FC236}">
-                <a16:creationId xmlns:a16="http://schemas.microsoft.com/office/drawing/2014/main" id="{047C8CCB-F95D-4249-92DD-651249D3535A}"/>
-              </a:ext>
-              <a:ext uri="{C183D7F6-B498-43B3-948B-1728B52AA6E4}">
-                <adec:decorative xmlns:adec="http://schemas.microsoft.com/office/drawing/2017/decorative" val="1"/>
-              </a:ext>
-            </a:extLst>
-          </p:cNvPr>
-          <p:cNvSpPr>
-            <a:spLocks noGrp="1" noRot="1" noChangeAspect="1" noMove="1" noResize="1" noEditPoints="1" noAdjustHandles="1" noChangeArrowheads="1" noChangeShapeType="1" noTextEdit="1"/>
-          </p:cNvSpPr>
-          <p:nvPr>
-            <p:extLst>
-              <p:ext uri="{386F3935-93C4-4BCD-93E2-E3B085C9AB24}">
-                <p16:designElem xmlns:p16="http://schemas.microsoft.com/office/powerpoint/2015/main" val="1"/>
-              </p:ext>
-            </p:extLst>
-          </p:nvPr>
-        </p:nvSpPr>
-        <p:spPr>
-          <a:xfrm>
-            <a:off x="0" y="0"/>
-            <a:ext cx="2013557" cy="6858000"/>
-          </a:xfrm>
-          <a:prstGeom prst="rect">
-            <a:avLst/>
-          </a:prstGeom>
-          <a:solidFill>
-            <a:srgbClr val="51513B"/>
-          </a:solidFill>
-          <a:ln>
-            <a:noFill/>
-          </a:ln>
-        </p:spPr>
-        <p:style>
-          <a:lnRef idx="2">
-            <a:schemeClr val="accent1">
-              <a:shade val="50000"/>
-            </a:schemeClr>
-          </a:lnRef>
-          <a:fillRef idx="1">
-            <a:schemeClr val="accent1"/>
-          </a:fillRef>
-          <a:effectRef idx="0">
-            <a:schemeClr val="accent1"/>
-          </a:effectRef>
-          <a:fontRef idx="minor">
-            <a:schemeClr val="lt1"/>
-          </a:fontRef>
-        </p:style>
-        <p:txBody>
-          <a:bodyPr rtlCol="0" anchor="ctr"/>
-          <a:lstStyle/>
-          <a:p>
-            <a:pPr algn="ctr"/>
-            <a:endParaRPr lang="en-US"/>
-          </a:p>
-        </p:txBody>
-      </p:sp>
-      <p:sp>
-        <p:nvSpPr>
-          <p:cNvPr id="2" name="Title 1">
-            <a:extLst>
-              <a:ext uri="{FF2B5EF4-FFF2-40B4-BE49-F238E27FC236}">
-                <a16:creationId xmlns:a16="http://schemas.microsoft.com/office/drawing/2014/main" id="{3760F8A1-A61F-4031-A50C-09202ABEA9DB}"/>
-              </a:ext>
-            </a:extLst>
-          </p:cNvPr>
-          <p:cNvSpPr>
-            <a:spLocks noGrp="1"/>
-          </p:cNvSpPr>
-          <p:nvPr>
-            <p:ph type="title"/>
-          </p:nvPr>
-        </p:nvSpPr>
-        <p:spPr>
-          <a:xfrm>
-            <a:off x="640080" y="2074363"/>
-            <a:ext cx="2752354" cy="2709275"/>
-          </a:xfrm>
-          <a:prstGeom prst="ellipse">
-            <a:avLst/>
-          </a:prstGeom>
-          <a:solidFill>
-            <a:srgbClr val="262626"/>
-          </a:solidFill>
-          <a:ln w="174625" cmpd="thinThick">
-            <a:solidFill>
-              <a:srgbClr val="262626"/>
-            </a:solidFill>
-          </a:ln>
-        </p:spPr>
-        <p:txBody>
-          <a:bodyPr vert="horz" lIns="91440" tIns="45720" rIns="91440" bIns="45720" rtlCol="0" anchor="ctr">
-            <a:normAutofit/>
-          </a:bodyPr>
-          <a:lstStyle/>
-          <a:p>
-            <a:pPr algn="ctr"/>
-            <a:r>
-              <a:rPr lang="en-US" sz="2600" kern="1200" dirty="0">
-                <a:solidFill>
-                  <a:srgbClr val="FFFFFF"/>
-                </a:solidFill>
-                <a:latin typeface="+mj-lt"/>
-                <a:ea typeface="+mj-ea"/>
-                <a:cs typeface="+mj-cs"/>
-              </a:rPr>
-              <a:t>User </a:t>
-            </a:r>
-            <a:r>
-              <a:rPr lang="en-US" sz="2600" dirty="0">
-                <a:solidFill>
-                  <a:srgbClr val="FFFFFF"/>
-                </a:solidFill>
-              </a:rPr>
-              <a:t>2</a:t>
-            </a:r>
-            <a:r>
-              <a:rPr lang="en-US" sz="2600" kern="1200" dirty="0">
-                <a:solidFill>
-                  <a:srgbClr val="FFFFFF"/>
-                </a:solidFill>
-                <a:latin typeface="+mj-lt"/>
-                <a:ea typeface="+mj-ea"/>
-                <a:cs typeface="+mj-cs"/>
-              </a:rPr>
-              <a:t> (200811)</a:t>
-            </a:r>
-          </a:p>
-        </p:txBody>
-      </p:sp>
-      <p:pic>
-        <p:nvPicPr>
-          <p:cNvPr id="5" name="Picture 4">
-            <a:extLst>
-              <a:ext uri="{FF2B5EF4-FFF2-40B4-BE49-F238E27FC236}">
-                <a16:creationId xmlns:a16="http://schemas.microsoft.com/office/drawing/2014/main" id="{A1B10AE1-0DA9-4134-B1DA-8F272DB5AA1A}"/>
-              </a:ext>
-            </a:extLst>
-          </p:cNvPr>
-          <p:cNvPicPr>
-            <a:picLocks noChangeAspect="1"/>
-          </p:cNvPicPr>
-          <p:nvPr/>
-        </p:nvPicPr>
-        <p:blipFill>
-          <a:blip r:embed="rId2">
-            <a:extLst>
-              <a:ext uri="{28A0092B-C50C-407E-A947-70E740481C1C}">
-                <a14:useLocalDpi xmlns:a14="http://schemas.microsoft.com/office/drawing/2010/main" val="0"/>
-              </a:ext>
-            </a:extLst>
-          </a:blip>
-          <a:stretch>
-            <a:fillRect/>
-          </a:stretch>
-        </p:blipFill>
-        <p:spPr>
-          <a:xfrm>
-            <a:off x="3480047" y="0"/>
-            <a:ext cx="8711953" cy="6858000"/>
-          </a:xfrm>
-          <a:prstGeom prst="rect">
-            <a:avLst/>
-          </a:prstGeom>
-        </p:spPr>
-      </p:pic>
-      <p:pic>
-        <p:nvPicPr>
-          <p:cNvPr id="11" name="Picture 10">
-            <a:extLst>
-              <a:ext uri="{FF2B5EF4-FFF2-40B4-BE49-F238E27FC236}">
-                <a16:creationId xmlns:a16="http://schemas.microsoft.com/office/drawing/2014/main" id="{DC974DA5-E2E5-4944-8259-A2BF984562CD}"/>
-              </a:ext>
-            </a:extLst>
-          </p:cNvPr>
-          <p:cNvPicPr>
-            <a:picLocks noChangeAspect="1"/>
-          </p:cNvPicPr>
-          <p:nvPr/>
-        </p:nvPicPr>
-        <p:blipFill>
-          <a:blip r:embed="rId2">
-            <a:extLst>
-              <a:ext uri="{28A0092B-C50C-407E-A947-70E740481C1C}">
-                <a14:useLocalDpi xmlns:a14="http://schemas.microsoft.com/office/drawing/2010/main" val="0"/>
-              </a:ext>
-            </a:extLst>
-          </a:blip>
-          <a:stretch>
-            <a:fillRect/>
-          </a:stretch>
-        </p:blipFill>
-        <p:spPr>
-          <a:xfrm>
-            <a:off x="3632447" y="152400"/>
-            <a:ext cx="8711953" cy="6858000"/>
-          </a:xfrm>
-          <a:prstGeom prst="rect">
-            <a:avLst/>
-          </a:prstGeom>
-        </p:spPr>
-      </p:pic>
-    </p:spTree>
-    <p:extLst>
-      <p:ext uri="{BB962C8B-B14F-4D97-AF65-F5344CB8AC3E}">
-        <p14:creationId xmlns:p14="http://schemas.microsoft.com/office/powerpoint/2010/main" val="3035141194"/>
-      </p:ext>
-    </p:extLst>
-  </p:cSld>
-  <p:clrMapOvr>
-    <a:masterClrMapping/>
-  </p:clrMapOvr>
-</p:sld>
-</file>
-
 <file path=ppt/slides/slide2.xml><?xml version="1.0" encoding="utf-8"?>
 <p:sld xmlns:a="http://schemas.openxmlformats.org/drawingml/2006/main" xmlns:r="http://schemas.openxmlformats.org/officeDocument/2006/relationships" xmlns:p="http://schemas.openxmlformats.org/presentationml/2006/main">
   <p:cSld>
@@ -9403,7 +9205,7 @@
       </p:grpSpPr>
       <p:sp>
         <p:nvSpPr>
-          <p:cNvPr id="9" name="Rectangle 8">
+          <p:cNvPr id="10" name="Rectangle 9">
             <a:extLst>
               <a:ext uri="{FF2B5EF4-FFF2-40B4-BE49-F238E27FC236}">
                 <a16:creationId xmlns:a16="http://schemas.microsoft.com/office/drawing/2014/main" id="{6753252F-4873-4F63-801D-CC719279A7D5}"/>
@@ -9466,6 +9268,315 @@
       </p:sp>
       <p:sp>
         <p:nvSpPr>
+          <p:cNvPr id="12" name="Rectangle 11">
+            <a:extLst>
+              <a:ext uri="{FF2B5EF4-FFF2-40B4-BE49-F238E27FC236}">
+                <a16:creationId xmlns:a16="http://schemas.microsoft.com/office/drawing/2014/main" id="{047C8CCB-F95D-4249-92DD-651249D3535A}"/>
+              </a:ext>
+              <a:ext uri="{C183D7F6-B498-43B3-948B-1728B52AA6E4}">
+                <adec:decorative xmlns:adec="http://schemas.microsoft.com/office/drawing/2017/decorative" val="1"/>
+              </a:ext>
+            </a:extLst>
+          </p:cNvPr>
+          <p:cNvSpPr>
+            <a:spLocks noGrp="1" noRot="1" noChangeAspect="1" noMove="1" noResize="1" noEditPoints="1" noAdjustHandles="1" noChangeArrowheads="1" noChangeShapeType="1" noTextEdit="1"/>
+          </p:cNvSpPr>
+          <p:nvPr>
+            <p:extLst>
+              <p:ext uri="{386F3935-93C4-4BCD-93E2-E3B085C9AB24}">
+                <p16:designElem xmlns:p16="http://schemas.microsoft.com/office/powerpoint/2015/main" val="1"/>
+              </p:ext>
+            </p:extLst>
+          </p:nvPr>
+        </p:nvSpPr>
+        <p:spPr>
+          <a:xfrm>
+            <a:off x="0" y="0"/>
+            <a:ext cx="2013557" cy="6858000"/>
+          </a:xfrm>
+          <a:prstGeom prst="rect">
+            <a:avLst/>
+          </a:prstGeom>
+          <a:solidFill>
+            <a:srgbClr val="51513B"/>
+          </a:solidFill>
+          <a:ln>
+            <a:noFill/>
+          </a:ln>
+        </p:spPr>
+        <p:style>
+          <a:lnRef idx="2">
+            <a:schemeClr val="accent1">
+              <a:shade val="50000"/>
+            </a:schemeClr>
+          </a:lnRef>
+          <a:fillRef idx="1">
+            <a:schemeClr val="accent1"/>
+          </a:fillRef>
+          <a:effectRef idx="0">
+            <a:schemeClr val="accent1"/>
+          </a:effectRef>
+          <a:fontRef idx="minor">
+            <a:schemeClr val="lt1"/>
+          </a:fontRef>
+        </p:style>
+        <p:txBody>
+          <a:bodyPr rtlCol="0" anchor="ctr"/>
+          <a:lstStyle/>
+          <a:p>
+            <a:pPr algn="ctr"/>
+            <a:endParaRPr lang="en-US"/>
+          </a:p>
+        </p:txBody>
+      </p:sp>
+      <p:sp>
+        <p:nvSpPr>
+          <p:cNvPr id="2" name="Title 1">
+            <a:extLst>
+              <a:ext uri="{FF2B5EF4-FFF2-40B4-BE49-F238E27FC236}">
+                <a16:creationId xmlns:a16="http://schemas.microsoft.com/office/drawing/2014/main" id="{3760F8A1-A61F-4031-A50C-09202ABEA9DB}"/>
+              </a:ext>
+            </a:extLst>
+          </p:cNvPr>
+          <p:cNvSpPr>
+            <a:spLocks noGrp="1"/>
+          </p:cNvSpPr>
+          <p:nvPr>
+            <p:ph type="title"/>
+          </p:nvPr>
+        </p:nvSpPr>
+        <p:spPr>
+          <a:xfrm>
+            <a:off x="640080" y="2074363"/>
+            <a:ext cx="2752354" cy="2709275"/>
+          </a:xfrm>
+          <a:prstGeom prst="ellipse">
+            <a:avLst/>
+          </a:prstGeom>
+          <a:solidFill>
+            <a:srgbClr val="262626"/>
+          </a:solidFill>
+          <a:ln w="174625" cmpd="thinThick">
+            <a:solidFill>
+              <a:srgbClr val="262626"/>
+            </a:solidFill>
+          </a:ln>
+        </p:spPr>
+        <p:txBody>
+          <a:bodyPr vert="horz" lIns="91440" tIns="45720" rIns="91440" bIns="45720" rtlCol="0" anchor="ctr">
+            <a:normAutofit/>
+          </a:bodyPr>
+          <a:lstStyle/>
+          <a:p>
+            <a:pPr algn="ctr"/>
+            <a:r>
+              <a:rPr lang="en-US" sz="2600" kern="1200" dirty="0">
+                <a:solidFill>
+                  <a:srgbClr val="FFFFFF"/>
+                </a:solidFill>
+                <a:latin typeface="+mj-lt"/>
+                <a:ea typeface="+mj-ea"/>
+                <a:cs typeface="+mj-cs"/>
+              </a:rPr>
+              <a:t>User </a:t>
+            </a:r>
+            <a:r>
+              <a:rPr lang="en-US" sz="2600" dirty="0">
+                <a:solidFill>
+                  <a:srgbClr val="FFFFFF"/>
+                </a:solidFill>
+              </a:rPr>
+              <a:t>2</a:t>
+            </a:r>
+            <a:r>
+              <a:rPr lang="en-US" sz="2600" kern="1200" dirty="0">
+                <a:solidFill>
+                  <a:srgbClr val="FFFFFF"/>
+                </a:solidFill>
+                <a:latin typeface="+mj-lt"/>
+                <a:ea typeface="+mj-ea"/>
+                <a:cs typeface="+mj-cs"/>
+              </a:rPr>
+              <a:t> (200811)</a:t>
+            </a:r>
+          </a:p>
+        </p:txBody>
+      </p:sp>
+      <p:pic>
+        <p:nvPicPr>
+          <p:cNvPr id="5" name="Picture 4">
+            <a:extLst>
+              <a:ext uri="{FF2B5EF4-FFF2-40B4-BE49-F238E27FC236}">
+                <a16:creationId xmlns:a16="http://schemas.microsoft.com/office/drawing/2014/main" id="{A1B10AE1-0DA9-4134-B1DA-8F272DB5AA1A}"/>
+              </a:ext>
+            </a:extLst>
+          </p:cNvPr>
+          <p:cNvPicPr>
+            <a:picLocks noChangeAspect="1"/>
+          </p:cNvPicPr>
+          <p:nvPr/>
+        </p:nvPicPr>
+        <p:blipFill>
+          <a:blip r:embed="rId2">
+            <a:extLst>
+              <a:ext uri="{28A0092B-C50C-407E-A947-70E740481C1C}">
+                <a14:useLocalDpi xmlns:a14="http://schemas.microsoft.com/office/drawing/2010/main" val="0"/>
+              </a:ext>
+            </a:extLst>
+          </a:blip>
+          <a:stretch>
+            <a:fillRect/>
+          </a:stretch>
+        </p:blipFill>
+        <p:spPr>
+          <a:xfrm>
+            <a:off x="3480047" y="0"/>
+            <a:ext cx="8711953" cy="6858000"/>
+          </a:xfrm>
+          <a:prstGeom prst="rect">
+            <a:avLst/>
+          </a:prstGeom>
+        </p:spPr>
+      </p:pic>
+      <p:pic>
+        <p:nvPicPr>
+          <p:cNvPr id="11" name="Picture 10">
+            <a:extLst>
+              <a:ext uri="{FF2B5EF4-FFF2-40B4-BE49-F238E27FC236}">
+                <a16:creationId xmlns:a16="http://schemas.microsoft.com/office/drawing/2014/main" id="{DC974DA5-E2E5-4944-8259-A2BF984562CD}"/>
+              </a:ext>
+            </a:extLst>
+          </p:cNvPr>
+          <p:cNvPicPr>
+            <a:picLocks noChangeAspect="1"/>
+          </p:cNvPicPr>
+          <p:nvPr/>
+        </p:nvPicPr>
+        <p:blipFill>
+          <a:blip r:embed="rId2">
+            <a:extLst>
+              <a:ext uri="{28A0092B-C50C-407E-A947-70E740481C1C}">
+                <a14:useLocalDpi xmlns:a14="http://schemas.microsoft.com/office/drawing/2010/main" val="0"/>
+              </a:ext>
+            </a:extLst>
+          </a:blip>
+          <a:stretch>
+            <a:fillRect/>
+          </a:stretch>
+        </p:blipFill>
+        <p:spPr>
+          <a:xfrm>
+            <a:off x="3632447" y="152400"/>
+            <a:ext cx="8711953" cy="6858000"/>
+          </a:xfrm>
+          <a:prstGeom prst="rect">
+            <a:avLst/>
+          </a:prstGeom>
+        </p:spPr>
+      </p:pic>
+    </p:spTree>
+    <p:extLst>
+      <p:ext uri="{BB962C8B-B14F-4D97-AF65-F5344CB8AC3E}">
+        <p14:creationId xmlns:p14="http://schemas.microsoft.com/office/powerpoint/2010/main" val="3035141194"/>
+      </p:ext>
+    </p:extLst>
+  </p:cSld>
+  <p:clrMapOvr>
+    <a:masterClrMapping/>
+  </p:clrMapOvr>
+</p:sld>
+</file>
+
+<file path=ppt/slides/slide21.xml><?xml version="1.0" encoding="utf-8"?>
+<p:sld xmlns:a="http://schemas.openxmlformats.org/drawingml/2006/main" xmlns:r="http://schemas.openxmlformats.org/officeDocument/2006/relationships" xmlns:p="http://schemas.openxmlformats.org/presentationml/2006/main">
+  <p:cSld>
+    <p:bg>
+      <p:bgPr>
+        <a:solidFill>
+          <a:schemeClr val="bg1"/>
+        </a:solidFill>
+        <a:effectLst/>
+      </p:bgPr>
+    </p:bg>
+    <p:spTree>
+      <p:nvGrpSpPr>
+        <p:cNvPr id="1" name=""/>
+        <p:cNvGrpSpPr/>
+        <p:nvPr/>
+      </p:nvGrpSpPr>
+      <p:grpSpPr>
+        <a:xfrm>
+          <a:off x="0" y="0"/>
+          <a:ext cx="0" cy="0"/>
+          <a:chOff x="0" y="0"/>
+          <a:chExt cx="0" cy="0"/>
+        </a:xfrm>
+      </p:grpSpPr>
+      <p:sp>
+        <p:nvSpPr>
+          <p:cNvPr id="9" name="Rectangle 8">
+            <a:extLst>
+              <a:ext uri="{FF2B5EF4-FFF2-40B4-BE49-F238E27FC236}">
+                <a16:creationId xmlns:a16="http://schemas.microsoft.com/office/drawing/2014/main" id="{6753252F-4873-4F63-801D-CC719279A7D5}"/>
+              </a:ext>
+              <a:ext uri="{C183D7F6-B498-43B3-948B-1728B52AA6E4}">
+                <adec:decorative xmlns:adec="http://schemas.microsoft.com/office/drawing/2017/decorative" val="1"/>
+              </a:ext>
+            </a:extLst>
+          </p:cNvPr>
+          <p:cNvSpPr>
+            <a:spLocks noGrp="1" noRot="1" noChangeAspect="1" noMove="1" noResize="1" noEditPoints="1" noAdjustHandles="1" noChangeArrowheads="1" noChangeShapeType="1" noTextEdit="1"/>
+          </p:cNvSpPr>
+          <p:nvPr>
+            <p:extLst>
+              <p:ext uri="{386F3935-93C4-4BCD-93E2-E3B085C9AB24}">
+                <p16:designElem xmlns:p16="http://schemas.microsoft.com/office/powerpoint/2015/main" val="1"/>
+              </p:ext>
+            </p:extLst>
+          </p:nvPr>
+        </p:nvSpPr>
+        <p:spPr>
+          <a:xfrm>
+            <a:off x="0" y="0"/>
+            <a:ext cx="12192000" cy="6858000"/>
+          </a:xfrm>
+          <a:prstGeom prst="rect">
+            <a:avLst/>
+          </a:prstGeom>
+          <a:solidFill>
+            <a:srgbClr val="FFFFFF"/>
+          </a:solidFill>
+          <a:ln>
+            <a:noFill/>
+          </a:ln>
+        </p:spPr>
+        <p:style>
+          <a:lnRef idx="2">
+            <a:schemeClr val="accent1">
+              <a:shade val="50000"/>
+            </a:schemeClr>
+          </a:lnRef>
+          <a:fillRef idx="1">
+            <a:schemeClr val="accent1"/>
+          </a:fillRef>
+          <a:effectRef idx="0">
+            <a:schemeClr val="accent1"/>
+          </a:effectRef>
+          <a:fontRef idx="minor">
+            <a:schemeClr val="lt1"/>
+          </a:fontRef>
+        </p:style>
+        <p:txBody>
+          <a:bodyPr rtlCol="0" anchor="ctr"/>
+          <a:lstStyle/>
+          <a:p>
+            <a:pPr algn="ctr"/>
+            <a:endParaRPr lang="en-US"/>
+          </a:p>
+        </p:txBody>
+      </p:sp>
+      <p:sp>
+        <p:nvSpPr>
           <p:cNvPr id="11" name="Rectangle 10">
             <a:extLst>
               <a:ext uri="{FF2B5EF4-FFF2-40B4-BE49-F238E27FC236}">
@@ -9630,7 +9741,7 @@
 </p:sld>
 </file>
 
-<file path=ppt/slides/slide21.xml><?xml version="1.0" encoding="utf-8"?>
+<file path=ppt/slides/slide22.xml><?xml version="1.0" encoding="utf-8"?>
 <p:sld xmlns:a="http://schemas.openxmlformats.org/drawingml/2006/main" xmlns:r="http://schemas.openxmlformats.org/officeDocument/2006/relationships" xmlns:p="http://schemas.openxmlformats.org/presentationml/2006/main">
   <p:cSld>
     <p:bg>

</xml_diff>